<commit_message>
smaller updated of presentation
</commit_message>
<xml_diff>
--- a/presentation/Inequality by Demographic Factors_V6.1.pptx
+++ b/presentation/Inequality by Demographic Factors_V6.1.pptx
@@ -157,7 +157,7 @@
   </p:defaultTextStyle>
   <p:extLst>
     <p:ext uri="{EFAFB233-063F-42B5-8137-9DF3F51BA10A}">
-      <p15:sldGuideLst xmlns="" xmlns:p15="http://schemas.microsoft.com/office/powerpoint/2012/main">
+      <p15:sldGuideLst xmlns:p15="http://schemas.microsoft.com/office/powerpoint/2012/main" xmlns="">
         <p15:guide id="1" orient="horz" pos="2160">
           <p15:clr>
             <a:srgbClr val="A4A3A4"/>
@@ -171,7 +171,7 @@
       </p15:sldGuideLst>
     </p:ext>
     <p:ext uri="{2D200454-40CA-4A62-9FC3-DE9A4176ACB9}">
-      <p15:notesGuideLst xmlns="" xmlns:p15="http://schemas.microsoft.com/office/powerpoint/2012/main">
+      <p15:notesGuideLst xmlns:p15="http://schemas.microsoft.com/office/powerpoint/2012/main" xmlns="">
         <p15:guide id="1" orient="horz" pos="3132">
           <p15:clr>
             <a:srgbClr val="A4A3A4"/>
@@ -10488,12 +10488,12 @@
           <a:graphicData uri="http://schemas.openxmlformats.org/presentationml/2006/ole">
             <mc:AlternateContent xmlns:mc="http://schemas.openxmlformats.org/markup-compatibility/2006">
               <mc:Choice xmlns:v="urn:schemas-microsoft-com:vml" Requires="v">
-                <p:oleObj spid="_x0000_s4121" name="Worksheet" r:id="rId5" imgW="4391011" imgH="2009843" progId="Excel.Sheet.12">
+                <p:oleObj spid="_x0000_s4123" name="Worksheet" r:id="rId4" imgW="4391011" imgH="2009843" progId="Excel.Sheet.12">
                   <p:embed/>
                 </p:oleObj>
               </mc:Choice>
               <mc:Fallback>
-                <p:oleObj name="Worksheet" r:id="rId5" imgW="4391011" imgH="2009843" progId="Excel.Sheet.12">
+                <p:oleObj name="Worksheet" r:id="rId4" imgW="4391011" imgH="2009843" progId="Excel.Sheet.12">
                   <p:embed/>
                   <p:pic>
                     <p:nvPicPr>
@@ -10502,7 +10502,7 @@
                       <p:nvPr/>
                     </p:nvPicPr>
                     <p:blipFill>
-                      <a:blip r:embed="rId6"/>
+                      <a:blip r:embed="rId5"/>
                       <a:stretch>
                         <a:fillRect/>
                       </a:stretch>
@@ -10828,12 +10828,12 @@
           <a:graphicData uri="http://schemas.openxmlformats.org/presentationml/2006/ole">
             <mc:AlternateContent xmlns:mc="http://schemas.openxmlformats.org/markup-compatibility/2006">
               <mc:Choice xmlns:v="urn:schemas-microsoft-com:vml" Requires="v">
-                <p:oleObj spid="_x0000_s3114" name="Worksheet" r:id="rId5" imgW="3952855" imgH="3429000" progId="Excel.Sheet.12">
+                <p:oleObj spid="_x0000_s3116" name="Worksheet" r:id="rId4" imgW="3952855" imgH="3429000" progId="Excel.Sheet.12">
                   <p:embed/>
                 </p:oleObj>
               </mc:Choice>
               <mc:Fallback>
-                <p:oleObj name="Worksheet" r:id="rId5" imgW="3952855" imgH="3429000" progId="Excel.Sheet.12">
+                <p:oleObj name="Worksheet" r:id="rId4" imgW="3952855" imgH="3429000" progId="Excel.Sheet.12">
                   <p:embed/>
                   <p:pic>
                     <p:nvPicPr>
@@ -10842,7 +10842,7 @@
                       <p:nvPr/>
                     </p:nvPicPr>
                     <p:blipFill>
-                      <a:blip r:embed="rId6"/>
+                      <a:blip r:embed="rId5"/>
                       <a:stretch>
                         <a:fillRect/>
                       </a:stretch>
@@ -12219,32 +12219,32 @@
       </p:sp>
       <p:graphicFrame>
         <p:nvGraphicFramePr>
-          <p:cNvPr id="5" name="Objekt 4"/>
+          <p:cNvPr id="7" name="Object 6"/>
           <p:cNvGraphicFramePr>
             <a:graphicFrameLocks noChangeAspect="1"/>
           </p:cNvGraphicFramePr>
           <p:nvPr>
             <p:extLst>
               <p:ext uri="{D42A27DB-BD31-4B8C-83A1-F6EECF244321}">
-                <p14:modId xmlns:p14="http://schemas.microsoft.com/office/powerpoint/2010/main" val="3912052695"/>
+                <p14:modId xmlns:p14="http://schemas.microsoft.com/office/powerpoint/2010/main" val="1143679325"/>
               </p:ext>
             </p:extLst>
           </p:nvPr>
         </p:nvGraphicFramePr>
         <p:xfrm>
-          <a:off x="3924055" y="2308469"/>
-          <a:ext cx="4391025" cy="2952750"/>
+          <a:off x="3614769" y="2368063"/>
+          <a:ext cx="5166863" cy="2925274"/>
         </p:xfrm>
         <a:graphic>
           <a:graphicData uri="http://schemas.openxmlformats.org/presentationml/2006/ole">
             <mc:AlternateContent xmlns:mc="http://schemas.openxmlformats.org/markup-compatibility/2006">
               <mc:Choice xmlns:v="urn:schemas-microsoft-com:vml" Requires="v">
-                <p:oleObj spid="_x0000_s8211" name="Worksheet" r:id="rId5" imgW="4391011" imgH="2952885" progId="Excel.Sheet.12">
+                <p:oleObj spid="_x0000_s8213" name="Worksheet" r:id="rId4" imgW="4391011" imgH="2485957" progId="Excel.Sheet.12">
                   <p:embed/>
                 </p:oleObj>
               </mc:Choice>
               <mc:Fallback>
-                <p:oleObj name="Worksheet" r:id="rId5" imgW="4391011" imgH="2952885" progId="Excel.Sheet.12">
+                <p:oleObj name="Worksheet" r:id="rId4" imgW="4391011" imgH="2485957" progId="Excel.Sheet.12">
                   <p:embed/>
                   <p:pic>
                     <p:nvPicPr>
@@ -12253,15 +12253,15 @@
                       <p:nvPr/>
                     </p:nvPicPr>
                     <p:blipFill>
-                      <a:blip r:embed="rId6"/>
+                      <a:blip r:embed="rId5"/>
                       <a:stretch>
                         <a:fillRect/>
                       </a:stretch>
                     </p:blipFill>
                     <p:spPr>
                       <a:xfrm>
-                        <a:off x="3924055" y="2308469"/>
-                        <a:ext cx="4391025" cy="2952750"/>
+                        <a:off x="3614769" y="2368063"/>
+                        <a:ext cx="5166863" cy="2925274"/>
                       </a:xfrm>
                       <a:prstGeom prst="rect">
                         <a:avLst/>
@@ -17251,12 +17251,12 @@
           <a:graphicData uri="http://schemas.openxmlformats.org/presentationml/2006/ole">
             <mc:AlternateContent xmlns:mc="http://schemas.openxmlformats.org/markup-compatibility/2006">
               <mc:Choice xmlns:v="urn:schemas-microsoft-com:vml" Requires="v">
-                <p:oleObj spid="_x0000_s2093" name="Worksheet" r:id="rId5" imgW="4057667" imgH="3152843" progId="Excel.Sheet.12">
+                <p:oleObj spid="_x0000_s2095" name="Worksheet" r:id="rId4" imgW="4057667" imgH="3152843" progId="Excel.Sheet.12">
                   <p:embed/>
                 </p:oleObj>
               </mc:Choice>
               <mc:Fallback>
-                <p:oleObj name="Worksheet" r:id="rId5" imgW="4057667" imgH="3152843" progId="Excel.Sheet.12">
+                <p:oleObj name="Worksheet" r:id="rId4" imgW="4057667" imgH="3152843" progId="Excel.Sheet.12">
                   <p:embed/>
                   <p:pic>
                     <p:nvPicPr>
@@ -17265,7 +17265,7 @@
                       <p:nvPr/>
                     </p:nvPicPr>
                     <p:blipFill>
-                      <a:blip r:embed="rId6"/>
+                      <a:blip r:embed="rId5"/>
                       <a:stretch>
                         <a:fillRect/>
                       </a:stretch>
@@ -18137,12 +18137,9 @@
 </file>
 
 <file path=customXml/item1.xml><?xml version="1.0" encoding="utf-8"?>
-<?mso-contentType ?>
-<FormTemplates xmlns="http://schemas.microsoft.com/sharepoint/v3/contenttype/forms">
-  <Display>DocumentLibraryForm</Display>
-  <Edit>DocumentLibraryForm</Edit>
-  <New>DocumentLibraryForm</New>
-</FormTemplates>
+<p:properties xmlns:p="http://schemas.microsoft.com/office/2006/metadata/properties" xmlns:xsi="http://www.w3.org/2001/XMLSchema-instance">
+  <documentManagement/>
+</p:properties>
 </file>
 
 <file path=customXml/item2.xml><?xml version="1.0" encoding="utf-8"?>
@@ -18260,15 +18257,25 @@
 </file>
 
 <file path=customXml/item3.xml><?xml version="1.0" encoding="utf-8"?>
-<p:properties xmlns:p="http://schemas.microsoft.com/office/2006/metadata/properties" xmlns:xsi="http://www.w3.org/2001/XMLSchema-instance">
-  <documentManagement/>
-</p:properties>
+<?mso-contentType ?>
+<FormTemplates xmlns="http://schemas.microsoft.com/sharepoint/v3/contenttype/forms">
+  <Display>DocumentLibraryForm</Display>
+  <Edit>DocumentLibraryForm</Edit>
+  <New>DocumentLibraryForm</New>
+</FormTemplates>
 </file>
 
 <file path=customXml/itemProps1.xml><?xml version="1.0" encoding="utf-8"?>
-<ds:datastoreItem xmlns:ds="http://schemas.openxmlformats.org/officeDocument/2006/customXml" ds:itemID="{38A61B13-3BD8-4182-A6C0-87987DF79A6D}">
+<ds:datastoreItem xmlns:ds="http://schemas.openxmlformats.org/officeDocument/2006/customXml" ds:itemID="{B470C3CE-871E-471D-827D-756DC4BA1786}">
   <ds:schemaRefs>
-    <ds:schemaRef ds:uri="http://schemas.microsoft.com/sharepoint/v3/contenttype/forms"/>
+    <ds:schemaRef ds:uri="http://schemas.openxmlformats.org/package/2006/metadata/core-properties"/>
+    <ds:schemaRef ds:uri="http://www.w3.org/XML/1998/namespace"/>
+    <ds:schemaRef ds:uri="http://schemas.microsoft.com/office/2006/documentManagement/types"/>
+    <ds:schemaRef ds:uri="http://purl.org/dc/elements/1.1/"/>
+    <ds:schemaRef ds:uri="http://purl.org/dc/dcmitype/"/>
+    <ds:schemaRef ds:uri="http://schemas.microsoft.com/office/infopath/2007/PartnerControls"/>
+    <ds:schemaRef ds:uri="http://schemas.microsoft.com/office/2006/metadata/properties"/>
+    <ds:schemaRef ds:uri="http://purl.org/dc/terms/"/>
   </ds:schemaRefs>
 </ds:datastoreItem>
 </file>
@@ -18290,16 +18297,9 @@
 </file>
 
 <file path=customXml/itemProps3.xml><?xml version="1.0" encoding="utf-8"?>
-<ds:datastoreItem xmlns:ds="http://schemas.openxmlformats.org/officeDocument/2006/customXml" ds:itemID="{B470C3CE-871E-471D-827D-756DC4BA1786}">
+<ds:datastoreItem xmlns:ds="http://schemas.openxmlformats.org/officeDocument/2006/customXml" ds:itemID="{38A61B13-3BD8-4182-A6C0-87987DF79A6D}">
   <ds:schemaRefs>
-    <ds:schemaRef ds:uri="http://www.w3.org/XML/1998/namespace"/>
-    <ds:schemaRef ds:uri="http://schemas.microsoft.com/office/2006/metadata/properties"/>
-    <ds:schemaRef ds:uri="http://schemas.microsoft.com/office/2006/documentManagement/types"/>
-    <ds:schemaRef ds:uri="http://purl.org/dc/elements/1.1/"/>
-    <ds:schemaRef ds:uri="http://purl.org/dc/dcmitype/"/>
-    <ds:schemaRef ds:uri="http://purl.org/dc/terms/"/>
-    <ds:schemaRef ds:uri="http://schemas.openxmlformats.org/package/2006/metadata/core-properties"/>
-    <ds:schemaRef ds:uri="http://schemas.microsoft.com/office/infopath/2007/PartnerControls"/>
+    <ds:schemaRef ds:uri="http://schemas.microsoft.com/sharepoint/v3/contenttype/forms"/>
   </ds:schemaRefs>
 </ds:datastoreItem>
 </file>
</xml_diff>